<commit_message>
updated the PPTx files
</commit_message>
<xml_diff>
--- a/zzz-additional-documentation/Rest-Api-Design-Build-Run-Day-1.pptx
+++ b/zzz-additional-documentation/Rest-Api-Design-Build-Run-Day-1.pptx
@@ -17081,10 +17081,10 @@
       </p:pic>
       <p:pic>
         <p:nvPicPr>
-          <p:cNvPr id="6" name="Picture 5">
+          <p:cNvPr id="7" name="Picture 6">
             <a:extLst>
               <a:ext uri="{FF2B5EF4-FFF2-40B4-BE49-F238E27FC236}">
-                <a16:creationId xmlns:a16="http://schemas.microsoft.com/office/drawing/2014/main" id="{50C3E76A-2843-12AA-8720-D49C55B401ED}"/>
+                <a16:creationId xmlns:a16="http://schemas.microsoft.com/office/drawing/2014/main" id="{4ACFD11C-52DA-5C53-4667-95DE2F92E8D0}"/>
               </a:ext>
             </a:extLst>
           </p:cNvPr>
@@ -17101,97 +17101,14 @@
         </p:blipFill>
         <p:spPr>
           <a:xfrm>
-            <a:off x="3834410" y="1499104"/>
-            <a:ext cx="6953202" cy="5120429"/>
+            <a:off x="3319102" y="1338791"/>
+            <a:ext cx="7249736" cy="5230403"/>
           </a:xfrm>
           <a:prstGeom prst="rect">
             <a:avLst/>
           </a:prstGeom>
         </p:spPr>
       </p:pic>
-      <p:sp>
-        <p:nvSpPr>
-          <p:cNvPr id="3" name="Right Brace 2">
-            <a:extLst>
-              <a:ext uri="{FF2B5EF4-FFF2-40B4-BE49-F238E27FC236}">
-                <a16:creationId xmlns:a16="http://schemas.microsoft.com/office/drawing/2014/main" id="{075A9DDA-E86C-CBFB-7B88-411664362216}"/>
-              </a:ext>
-            </a:extLst>
-          </p:cNvPr>
-          <p:cNvSpPr/>
-          <p:nvPr/>
-        </p:nvSpPr>
-        <p:spPr>
-          <a:xfrm>
-            <a:off x="7177083" y="1579418"/>
-            <a:ext cx="267855" cy="674255"/>
-          </a:xfrm>
-          <a:prstGeom prst="rightBrace">
-            <a:avLst/>
-          </a:prstGeom>
-        </p:spPr>
-        <p:style>
-          <a:lnRef idx="1">
-            <a:schemeClr val="accent1"/>
-          </a:lnRef>
-          <a:fillRef idx="0">
-            <a:schemeClr val="accent1"/>
-          </a:fillRef>
-          <a:effectRef idx="0">
-            <a:schemeClr val="accent1"/>
-          </a:effectRef>
-          <a:fontRef idx="minor">
-            <a:schemeClr val="tx1"/>
-          </a:fontRef>
-        </p:style>
-        <p:txBody>
-          <a:bodyPr rtlCol="0" anchor="ctr"/>
-          <a:lstStyle/>
-          <a:p>
-            <a:pPr algn="ctr"/>
-            <a:endParaRPr lang="en-US"/>
-          </a:p>
-        </p:txBody>
-      </p:sp>
-      <p:sp>
-        <p:nvSpPr>
-          <p:cNvPr id="4" name="TextBox 3">
-            <a:extLst>
-              <a:ext uri="{FF2B5EF4-FFF2-40B4-BE49-F238E27FC236}">
-                <a16:creationId xmlns:a16="http://schemas.microsoft.com/office/drawing/2014/main" id="{D9E7BFD4-46C0-2A31-6B6F-2CA60598324A}"/>
-              </a:ext>
-            </a:extLst>
-          </p:cNvPr>
-          <p:cNvSpPr txBox="1"/>
-          <p:nvPr/>
-        </p:nvSpPr>
-        <p:spPr>
-          <a:xfrm>
-            <a:off x="7444938" y="1570181"/>
-            <a:ext cx="2885934" cy="707886"/>
-          </a:xfrm>
-          <a:prstGeom prst="rect">
-            <a:avLst/>
-          </a:prstGeom>
-          <a:noFill/>
-        </p:spPr>
-        <p:txBody>
-          <a:bodyPr wrap="square" rtlCol="0">
-            <a:spAutoFit/>
-          </a:bodyPr>
-          <a:lstStyle/>
-          <a:p>
-            <a:r>
-              <a:rPr lang="en-US" sz="2000" dirty="0">
-                <a:solidFill>
-                  <a:schemeClr val="accent3"/>
-                </a:solidFill>
-              </a:rPr>
-              <a:t>Something to represent the domain.</a:t>
-            </a:r>
-          </a:p>
-        </p:txBody>
-      </p:sp>
     </p:spTree>
     <p:extLst>
       <p:ext uri="{BB962C8B-B14F-4D97-AF65-F5344CB8AC3E}">

</xml_diff>

<commit_message>
latest updates to pptx files (#6)
Co-authored-by: Anibal Velarde <anibal.velarde@protolabs.com>
</commit_message>
<xml_diff>
--- a/zzz-additional-documentation/Rest-Api-Design-Build-Run-Day-1.pptx
+++ b/zzz-additional-documentation/Rest-Api-Design-Build-Run-Day-1.pptx
@@ -7076,7 +7076,7 @@
           <a:p>
             <a:fld id="{CABBF519-BB17-4C09-A473-025D7A25044D}" type="slidenum">
               <a:rPr lang="en-US" smtClean="0"/>
-              <a:t>16</a:t>
+              <a:t>12</a:t>
             </a:fld>
             <a:endParaRPr lang="en-US"/>
           </a:p>
@@ -7085,7 +7085,7 @@
     </p:spTree>
     <p:extLst>
       <p:ext uri="{BB962C8B-B14F-4D97-AF65-F5344CB8AC3E}">
-        <p14:creationId xmlns:p14="http://schemas.microsoft.com/office/powerpoint/2010/main" val="1682103107"/>
+        <p14:creationId xmlns:p14="http://schemas.microsoft.com/office/powerpoint/2010/main" val="103272085"/>
       </p:ext>
     </p:extLst>
   </p:cSld>
@@ -7160,6 +7160,90 @@
           <a:p>
             <a:fld id="{CABBF519-BB17-4C09-A473-025D7A25044D}" type="slidenum">
               <a:rPr lang="en-US" smtClean="0"/>
+              <a:t>16</a:t>
+            </a:fld>
+            <a:endParaRPr lang="en-US"/>
+          </a:p>
+        </p:txBody>
+      </p:sp>
+    </p:spTree>
+    <p:extLst>
+      <p:ext uri="{BB962C8B-B14F-4D97-AF65-F5344CB8AC3E}">
+        <p14:creationId xmlns:p14="http://schemas.microsoft.com/office/powerpoint/2010/main" val="1682103107"/>
+      </p:ext>
+    </p:extLst>
+  </p:cSld>
+  <p:clrMapOvr>
+    <a:masterClrMapping/>
+  </p:clrMapOvr>
+</p:notes>
+</file>
+
+<file path=ppt/notesSlides/notesSlide4.xml><?xml version="1.0" encoding="utf-8"?>
+<p:notes xmlns:a="http://schemas.openxmlformats.org/drawingml/2006/main" xmlns:r="http://schemas.openxmlformats.org/officeDocument/2006/relationships" xmlns:p="http://schemas.openxmlformats.org/presentationml/2006/main">
+  <p:cSld>
+    <p:spTree>
+      <p:nvGrpSpPr>
+        <p:cNvPr id="1" name=""/>
+        <p:cNvGrpSpPr/>
+        <p:nvPr/>
+      </p:nvGrpSpPr>
+      <p:grpSpPr>
+        <a:xfrm>
+          <a:off x="0" y="0"/>
+          <a:ext cx="0" cy="0"/>
+          <a:chOff x="0" y="0"/>
+          <a:chExt cx="0" cy="0"/>
+        </a:xfrm>
+      </p:grpSpPr>
+      <p:sp>
+        <p:nvSpPr>
+          <p:cNvPr id="2" name="Slide Image Placeholder 1"/>
+          <p:cNvSpPr>
+            <a:spLocks noGrp="1" noRot="1" noChangeAspect="1"/>
+          </p:cNvSpPr>
+          <p:nvPr>
+            <p:ph type="sldImg"/>
+          </p:nvPr>
+        </p:nvSpPr>
+        <p:spPr/>
+      </p:sp>
+      <p:sp>
+        <p:nvSpPr>
+          <p:cNvPr id="3" name="Notes Placeholder 2"/>
+          <p:cNvSpPr>
+            <a:spLocks noGrp="1"/>
+          </p:cNvSpPr>
+          <p:nvPr>
+            <p:ph type="body" idx="1"/>
+          </p:nvPr>
+        </p:nvSpPr>
+        <p:spPr/>
+        <p:txBody>
+          <a:bodyPr/>
+          <a:lstStyle/>
+          <a:p>
+            <a:endParaRPr lang="en-US"/>
+          </a:p>
+        </p:txBody>
+      </p:sp>
+      <p:sp>
+        <p:nvSpPr>
+          <p:cNvPr id="4" name="Slide Number Placeholder 3"/>
+          <p:cNvSpPr>
+            <a:spLocks noGrp="1"/>
+          </p:cNvSpPr>
+          <p:nvPr>
+            <p:ph type="sldNum" sz="quarter" idx="5"/>
+          </p:nvPr>
+        </p:nvSpPr>
+        <p:spPr/>
+        <p:txBody>
+          <a:bodyPr/>
+          <a:lstStyle/>
+          <a:p>
+            <a:fld id="{CABBF519-BB17-4C09-A473-025D7A25044D}" type="slidenum">
+              <a:rPr lang="en-US" smtClean="0"/>
               <a:t>22</a:t>
             </a:fld>
             <a:endParaRPr lang="en-US"/>
@@ -7179,7 +7263,7 @@
 </p:notes>
 </file>
 
-<file path=ppt/notesSlides/notesSlide4.xml><?xml version="1.0" encoding="utf-8"?>
+<file path=ppt/notesSlides/notesSlide5.xml><?xml version="1.0" encoding="utf-8"?>
 <p:notes xmlns:a="http://schemas.openxmlformats.org/drawingml/2006/main" xmlns:r="http://schemas.openxmlformats.org/officeDocument/2006/relationships" xmlns:p="http://schemas.openxmlformats.org/presentationml/2006/main">
   <p:cSld>
     <p:spTree>
@@ -14422,7 +14506,7 @@
         </p:spPr>
         <p:txBody>
           <a:bodyPr>
-            <a:normAutofit fontScale="77500" lnSpcReduction="20000"/>
+            <a:normAutofit fontScale="62500" lnSpcReduction="20000"/>
           </a:bodyPr>
           <a:lstStyle/>
           <a:p>
@@ -14600,6 +14684,19 @@
             <a:r>
               <a:rPr lang="en-US" dirty="0"/>
               <a:t>5xx | Server-side Errors</a:t>
+            </a:r>
+          </a:p>
+          <a:p>
+            <a:r>
+              <a:rPr lang="en-US" dirty="0"/>
+              <a:t>Richardson Maturity Model (RMM)</a:t>
+            </a:r>
+          </a:p>
+          <a:p>
+            <a:pPr lvl="1"/>
+            <a:r>
+              <a:rPr lang="en-US" dirty="0"/>
+              <a:t>Strive for RMM - Level 2</a:t>
             </a:r>
           </a:p>
           <a:p>
@@ -25963,7 +26060,7 @@
           <a:p>
             <a:r>
               <a:rPr lang="en-US" dirty="0"/>
-              <a:t>Keep in mind the REST Maturity Model as you design your API surface</a:t>
+              <a:t>Keep in mind the Richardson Maturity Model (RMM) as you design your API surface</a:t>
             </a:r>
           </a:p>
           <a:p>
@@ -27132,8 +27229,27 @@
             </a:r>
             <a:r>
               <a:rPr lang="en-US" dirty="0"/>
-              <a:t> mono-repo</a:t>
-            </a:r>
+              <a:t> mono-repo  [</a:t>
+            </a:r>
+            <a:r>
+              <a:rPr lang="en-US" dirty="0">
+                <a:solidFill>
+                  <a:schemeClr val="accent1"/>
+                </a:solidFill>
+                <a:latin typeface="OCR A Extended" panose="02010509020102010303" pitchFamily="50" charset="0"/>
+              </a:rPr>
+              <a:t>QR Code</a:t>
+            </a:r>
+            <a:r>
+              <a:rPr lang="en-US" dirty="0"/>
+              <a:t>]</a:t>
+            </a:r>
+            <a:endParaRPr lang="en-US" dirty="0">
+              <a:solidFill>
+                <a:schemeClr val="accent1"/>
+              </a:solidFill>
+              <a:latin typeface="OCR A Extended" panose="02010509020102010303" pitchFamily="50" charset="0"/>
+            </a:endParaRPr>
           </a:p>
           <a:p>
             <a:pPr lvl="1"/>
@@ -27206,6 +27322,42 @@
           </a:p>
         </p:txBody>
       </p:sp>
+      <p:pic>
+        <p:nvPicPr>
+          <p:cNvPr id="5" name="Graphic 4">
+            <a:extLst>
+              <a:ext uri="{FF2B5EF4-FFF2-40B4-BE49-F238E27FC236}">
+                <a16:creationId xmlns:a16="http://schemas.microsoft.com/office/drawing/2014/main" id="{7B11E88C-2E33-3CA2-17BA-B766A764478B}"/>
+              </a:ext>
+            </a:extLst>
+          </p:cNvPr>
+          <p:cNvPicPr>
+            <a:picLocks noChangeAspect="1"/>
+          </p:cNvPicPr>
+          <p:nvPr/>
+        </p:nvPicPr>
+        <p:blipFill>
+          <a:blip r:embed="rId2">
+            <a:extLst>
+              <a:ext uri="{96DAC541-7B7A-43D3-8B79-37D633B846F1}">
+                <asvg:svgBlip xmlns:asvg="http://schemas.microsoft.com/office/drawing/2016/SVG/main" r:embed="rId3"/>
+              </a:ext>
+            </a:extLst>
+          </a:blip>
+          <a:stretch>
+            <a:fillRect/>
+          </a:stretch>
+        </p:blipFill>
+        <p:spPr>
+          <a:xfrm>
+            <a:off x="7725395" y="1368655"/>
+            <a:ext cx="3552810" cy="4952300"/>
+          </a:xfrm>
+          <a:prstGeom prst="rect">
+            <a:avLst/>
+          </a:prstGeom>
+        </p:spPr>
+      </p:pic>
     </p:spTree>
     <p:extLst>
       <p:ext uri="{BB962C8B-B14F-4D97-AF65-F5344CB8AC3E}">

</xml_diff>